<commit_message>
Update disposable reverse proxy architecture pptx demo
</commit_message>
<xml_diff>
--- a/doc/b1873 - Disposable reverse proxy architecture.pptx
+++ b/doc/b1873 - Disposable reverse proxy architecture.pptx
@@ -261,7 +261,7 @@
           <a:p>
             <a:fld id="{24077C6C-A31D-4D75-B922-498914159D5A}" type="datetimeFigureOut">
               <a:rPr lang="en-GB" smtClean="0"/>
-              <a:t>03/01/2024</a:t>
+              <a:t>04/01/2024</a:t>
             </a:fld>
             <a:endParaRPr lang="en-GB"/>
           </a:p>
@@ -461,7 +461,7 @@
           <a:p>
             <a:fld id="{24077C6C-A31D-4D75-B922-498914159D5A}" type="datetimeFigureOut">
               <a:rPr lang="en-GB" smtClean="0"/>
-              <a:t>03/01/2024</a:t>
+              <a:t>04/01/2024</a:t>
             </a:fld>
             <a:endParaRPr lang="en-GB"/>
           </a:p>
@@ -671,7 +671,7 @@
           <a:p>
             <a:fld id="{24077C6C-A31D-4D75-B922-498914159D5A}" type="datetimeFigureOut">
               <a:rPr lang="en-GB" smtClean="0"/>
-              <a:t>03/01/2024</a:t>
+              <a:t>04/01/2024</a:t>
             </a:fld>
             <a:endParaRPr lang="en-GB"/>
           </a:p>
@@ -871,7 +871,7 @@
           <a:p>
             <a:fld id="{24077C6C-A31D-4D75-B922-498914159D5A}" type="datetimeFigureOut">
               <a:rPr lang="en-GB" smtClean="0"/>
-              <a:t>03/01/2024</a:t>
+              <a:t>04/01/2024</a:t>
             </a:fld>
             <a:endParaRPr lang="en-GB"/>
           </a:p>
@@ -1147,7 +1147,7 @@
           <a:p>
             <a:fld id="{24077C6C-A31D-4D75-B922-498914159D5A}" type="datetimeFigureOut">
               <a:rPr lang="en-GB" smtClean="0"/>
-              <a:t>03/01/2024</a:t>
+              <a:t>04/01/2024</a:t>
             </a:fld>
             <a:endParaRPr lang="en-GB"/>
           </a:p>
@@ -1415,7 +1415,7 @@
           <a:p>
             <a:fld id="{24077C6C-A31D-4D75-B922-498914159D5A}" type="datetimeFigureOut">
               <a:rPr lang="en-GB" smtClean="0"/>
-              <a:t>03/01/2024</a:t>
+              <a:t>04/01/2024</a:t>
             </a:fld>
             <a:endParaRPr lang="en-GB"/>
           </a:p>
@@ -1830,7 +1830,7 @@
           <a:p>
             <a:fld id="{24077C6C-A31D-4D75-B922-498914159D5A}" type="datetimeFigureOut">
               <a:rPr lang="en-GB" smtClean="0"/>
-              <a:t>03/01/2024</a:t>
+              <a:t>04/01/2024</a:t>
             </a:fld>
             <a:endParaRPr lang="en-GB"/>
           </a:p>
@@ -1972,7 +1972,7 @@
           <a:p>
             <a:fld id="{24077C6C-A31D-4D75-B922-498914159D5A}" type="datetimeFigureOut">
               <a:rPr lang="en-GB" smtClean="0"/>
-              <a:t>03/01/2024</a:t>
+              <a:t>04/01/2024</a:t>
             </a:fld>
             <a:endParaRPr lang="en-GB"/>
           </a:p>
@@ -2085,7 +2085,7 @@
           <a:p>
             <a:fld id="{24077C6C-A31D-4D75-B922-498914159D5A}" type="datetimeFigureOut">
               <a:rPr lang="en-GB" smtClean="0"/>
-              <a:t>03/01/2024</a:t>
+              <a:t>04/01/2024</a:t>
             </a:fld>
             <a:endParaRPr lang="en-GB"/>
           </a:p>
@@ -2398,7 +2398,7 @@
           <a:p>
             <a:fld id="{24077C6C-A31D-4D75-B922-498914159D5A}" type="datetimeFigureOut">
               <a:rPr lang="en-GB" smtClean="0"/>
-              <a:t>03/01/2024</a:t>
+              <a:t>04/01/2024</a:t>
             </a:fld>
             <a:endParaRPr lang="en-GB"/>
           </a:p>
@@ -2687,7 +2687,7 @@
           <a:p>
             <a:fld id="{24077C6C-A31D-4D75-B922-498914159D5A}" type="datetimeFigureOut">
               <a:rPr lang="en-GB" smtClean="0"/>
-              <a:t>03/01/2024</a:t>
+              <a:t>04/01/2024</a:t>
             </a:fld>
             <a:endParaRPr lang="en-GB"/>
           </a:p>
@@ -2930,7 +2930,7 @@
           <a:p>
             <a:fld id="{24077C6C-A31D-4D75-B922-498914159D5A}" type="datetimeFigureOut">
               <a:rPr lang="en-GB" smtClean="0"/>
-              <a:t>03/01/2024</a:t>
+              <a:t>04/01/2024</a:t>
             </a:fld>
             <a:endParaRPr lang="en-GB"/>
           </a:p>
@@ -4331,7 +4331,7 @@
         <p:spPr>
           <a:xfrm>
             <a:off x="8637495" y="5107454"/>
-            <a:ext cx="3202204" cy="1066833"/>
+            <a:ext cx="3202204" cy="1259870"/>
           </a:xfrm>
           <a:prstGeom prst="flowChartMultidocument">
             <a:avLst/>
@@ -4364,7 +4364,7 @@
             </a:r>
             <a:r>
               <a:rPr lang="en-GB" sz="1100" dirty="0"/>
-              <a:t>(be that on a multi-instance, an entire instance, perhaps some replicas are shared, etc.)</a:t>
+              <a:t>(be that on a server, an independent instance, perhaps some replicas the master is independent but the replicas are shared, etc.)</a:t>
             </a:r>
           </a:p>
         </p:txBody>
@@ -4427,7 +4427,7 @@
         <p:spPr>
           <a:xfrm>
             <a:off x="9238129" y="2307723"/>
-            <a:ext cx="1783977" cy="430887"/>
+            <a:ext cx="1783977" cy="600164"/>
           </a:xfrm>
           <a:prstGeom prst="rect">
             <a:avLst/>
@@ -4459,7 +4459,7 @@
             </a:pPr>
             <a:r>
               <a:rPr lang="en-GB" sz="1100" dirty="0"/>
-              <a:t>Temp rules without </a:t>
+              <a:t>Temporary rules without </a:t>
             </a:r>
             <a:r>
               <a:rPr lang="en-GB" sz="1100" dirty="0" err="1"/>
@@ -4467,7 +4467,7 @@
             </a:r>
             <a:r>
               <a:rPr lang="en-GB" sz="1100" dirty="0"/>
-              <a:t>/route53 rule</a:t>
+              <a:t>/route53 rule, which point to sailing servers</a:t>
             </a:r>
           </a:p>
         </p:txBody>
@@ -4542,8 +4542,8 @@
         </p:nvCxnSpPr>
         <p:spPr>
           <a:xfrm>
-            <a:off x="10130118" y="2738610"/>
-            <a:ext cx="328779" cy="2368844"/>
+            <a:off x="10130118" y="2907887"/>
+            <a:ext cx="328779" cy="2199567"/>
           </a:xfrm>
           <a:prstGeom prst="straightConnector1">
             <a:avLst/>
@@ -5250,7 +5250,7 @@
             </a:r>
             <a:r>
               <a:rPr lang="en-GB" sz="1300" dirty="0"/>
-              <a:t> ALB are separate listeners</a:t>
+              <a:t> ALBs are separate listeners</a:t>
             </a:r>
           </a:p>
         </p:txBody>

</xml_diff>